<commit_message>
Added training and sources to presentation.
</commit_message>
<xml_diff>
--- a/Ondruška_NN_2021.pptx
+++ b/Ondruška_NN_2021.pptx
@@ -10,11 +10,13 @@
     <p:sldId id="258" r:id="rId4"/>
     <p:sldId id="259" r:id="rId5"/>
     <p:sldId id="266" r:id="rId6"/>
-    <p:sldId id="262" r:id="rId7"/>
-    <p:sldId id="261" r:id="rId8"/>
-    <p:sldId id="263" r:id="rId9"/>
-    <p:sldId id="264" r:id="rId10"/>
-    <p:sldId id="265" r:id="rId11"/>
+    <p:sldId id="267" r:id="rId7"/>
+    <p:sldId id="262" r:id="rId8"/>
+    <p:sldId id="261" r:id="rId9"/>
+    <p:sldId id="263" r:id="rId10"/>
+    <p:sldId id="264" r:id="rId11"/>
+    <p:sldId id="265" r:id="rId12"/>
+    <p:sldId id="268" r:id="rId13"/>
   </p:sldIdLst>
   <p:sldSz cx="12192000" cy="6858000"/>
   <p:notesSz cx="6858000" cy="9144000"/>
@@ -347,7 +349,7 @@
           <a:p>
             <a:fld id="{35A97C1D-E540-4DCF-A901-CB222F40D465}" type="datetimeFigureOut">
               <a:rPr lang="sk-SK" smtClean="0"/>
-              <a:t>6. 5. 2021</a:t>
+              <a:t>7. 5. 2021</a:t>
             </a:fld>
             <a:endParaRPr lang="sk-SK"/>
           </a:p>
@@ -555,7 +557,7 @@
           <a:p>
             <a:fld id="{35A97C1D-E540-4DCF-A901-CB222F40D465}" type="datetimeFigureOut">
               <a:rPr lang="sk-SK" smtClean="0"/>
-              <a:t>6. 5. 2021</a:t>
+              <a:t>7. 5. 2021</a:t>
             </a:fld>
             <a:endParaRPr lang="sk-SK"/>
           </a:p>
@@ -811,7 +813,7 @@
           <a:p>
             <a:fld id="{35A97C1D-E540-4DCF-A901-CB222F40D465}" type="datetimeFigureOut">
               <a:rPr lang="sk-SK" smtClean="0"/>
-              <a:t>6. 5. 2021</a:t>
+              <a:t>7. 5. 2021</a:t>
             </a:fld>
             <a:endParaRPr lang="sk-SK"/>
           </a:p>
@@ -981,7 +983,7 @@
           <a:p>
             <a:fld id="{35A97C1D-E540-4DCF-A901-CB222F40D465}" type="datetimeFigureOut">
               <a:rPr lang="sk-SK" smtClean="0"/>
-              <a:t>6. 5. 2021</a:t>
+              <a:t>7. 5. 2021</a:t>
             </a:fld>
             <a:endParaRPr lang="sk-SK"/>
           </a:p>
@@ -1324,7 +1326,7 @@
           <a:p>
             <a:fld id="{35A97C1D-E540-4DCF-A901-CB222F40D465}" type="datetimeFigureOut">
               <a:rPr lang="sk-SK" smtClean="0"/>
-              <a:t>6. 5. 2021</a:t>
+              <a:t>7. 5. 2021</a:t>
             </a:fld>
             <a:endParaRPr lang="sk-SK"/>
           </a:p>
@@ -1599,7 +1601,7 @@
           <a:p>
             <a:fld id="{35A97C1D-E540-4DCF-A901-CB222F40D465}" type="datetimeFigureOut">
               <a:rPr lang="sk-SK" smtClean="0"/>
-              <a:t>6. 5. 2021</a:t>
+              <a:t>7. 5. 2021</a:t>
             </a:fld>
             <a:endParaRPr lang="sk-SK"/>
           </a:p>
@@ -1978,7 +1980,7 @@
           <a:p>
             <a:fld id="{35A97C1D-E540-4DCF-A901-CB222F40D465}" type="datetimeFigureOut">
               <a:rPr lang="sk-SK" smtClean="0"/>
-              <a:t>6. 5. 2021</a:t>
+              <a:t>7. 5. 2021</a:t>
             </a:fld>
             <a:endParaRPr lang="sk-SK"/>
           </a:p>
@@ -2096,7 +2098,7 @@
           <a:p>
             <a:fld id="{35A97C1D-E540-4DCF-A901-CB222F40D465}" type="datetimeFigureOut">
               <a:rPr lang="sk-SK" smtClean="0"/>
-              <a:t>6. 5. 2021</a:t>
+              <a:t>7. 5. 2021</a:t>
             </a:fld>
             <a:endParaRPr lang="sk-SK"/>
           </a:p>
@@ -2267,7 +2269,7 @@
           <a:p>
             <a:fld id="{35A97C1D-E540-4DCF-A901-CB222F40D465}" type="datetimeFigureOut">
               <a:rPr lang="sk-SK" smtClean="0"/>
-              <a:t>6. 5. 2021</a:t>
+              <a:t>7. 5. 2021</a:t>
             </a:fld>
             <a:endParaRPr lang="sk-SK"/>
           </a:p>
@@ -2621,7 +2623,7 @@
           <a:p>
             <a:fld id="{35A97C1D-E540-4DCF-A901-CB222F40D465}" type="datetimeFigureOut">
               <a:rPr lang="sk-SK" smtClean="0"/>
-              <a:t>6. 5. 2021</a:t>
+              <a:t>7. 5. 2021</a:t>
             </a:fld>
             <a:endParaRPr lang="sk-SK"/>
           </a:p>
@@ -2998,7 +3000,7 @@
           <a:p>
             <a:fld id="{35A97C1D-E540-4DCF-A901-CB222F40D465}" type="datetimeFigureOut">
               <a:rPr lang="sk-SK" smtClean="0"/>
-              <a:t>6. 5. 2021</a:t>
+              <a:t>7. 5. 2021</a:t>
             </a:fld>
             <a:endParaRPr lang="sk-SK"/>
           </a:p>
@@ -3285,7 +3287,7 @@
           <a:p>
             <a:fld id="{35A97C1D-E540-4DCF-A901-CB222F40D465}" type="datetimeFigureOut">
               <a:rPr lang="sk-SK" smtClean="0"/>
-              <a:t>6. 5. 2021</a:t>
+              <a:t>7. 5. 2021</a:t>
             </a:fld>
             <a:endParaRPr lang="sk-SK"/>
           </a:p>
@@ -3889,6 +3891,128 @@
 <file path=ppt/slides/slide10.xml><?xml version="1.0" encoding="utf-8"?>
 <p:sld xmlns:a="http://schemas.openxmlformats.org/drawingml/2006/main" xmlns:r="http://schemas.openxmlformats.org/officeDocument/2006/relationships" xmlns:p="http://schemas.openxmlformats.org/presentationml/2006/main">
   <p:cSld>
+    <p:spTree>
+      <p:nvGrpSpPr>
+        <p:cNvPr id="1" name=""/>
+        <p:cNvGrpSpPr/>
+        <p:nvPr/>
+      </p:nvGrpSpPr>
+      <p:grpSpPr>
+        <a:xfrm>
+          <a:off x="0" y="0"/>
+          <a:ext cx="0" cy="0"/>
+          <a:chOff x="0" y="0"/>
+          <a:chExt cx="0" cy="0"/>
+        </a:xfrm>
+      </p:grpSpPr>
+      <p:sp>
+        <p:nvSpPr>
+          <p:cNvPr id="2" name="Nadpis 1">
+            <a:extLst>
+              <a:ext uri="{FF2B5EF4-FFF2-40B4-BE49-F238E27FC236}">
+                <a16:creationId xmlns:a16="http://schemas.microsoft.com/office/drawing/2014/main" id="{532FA631-A2AE-41C3-B177-7B4051579762}"/>
+              </a:ext>
+            </a:extLst>
+          </p:cNvPr>
+          <p:cNvSpPr>
+            <a:spLocks noGrp="1"/>
+          </p:cNvSpPr>
+          <p:nvPr>
+            <p:ph type="title"/>
+          </p:nvPr>
+        </p:nvSpPr>
+        <p:spPr/>
+        <p:txBody>
+          <a:bodyPr/>
+          <a:lstStyle/>
+          <a:p>
+            <a:r>
+              <a:rPr lang="sk-SK" dirty="0"/>
+              <a:t>Najčastejšie chyby</a:t>
+            </a:r>
+          </a:p>
+        </p:txBody>
+      </p:sp>
+      <p:sp>
+        <p:nvSpPr>
+          <p:cNvPr id="3" name="Zástupný objekt pre obsah 2">
+            <a:extLst>
+              <a:ext uri="{FF2B5EF4-FFF2-40B4-BE49-F238E27FC236}">
+                <a16:creationId xmlns:a16="http://schemas.microsoft.com/office/drawing/2014/main" id="{9ED4A7A2-D93E-4E86-827C-93BC94A45275}"/>
+              </a:ext>
+            </a:extLst>
+          </p:cNvPr>
+          <p:cNvSpPr>
+            <a:spLocks noGrp="1"/>
+          </p:cNvSpPr>
+          <p:nvPr>
+            <p:ph idx="1"/>
+          </p:nvPr>
+        </p:nvSpPr>
+        <p:spPr/>
+        <p:txBody>
+          <a:bodyPr>
+            <a:normAutofit/>
+          </a:bodyPr>
+          <a:lstStyle/>
+          <a:p>
+            <a:pPr>
+              <a:buFont typeface="Arial" panose="020B0604020202020204" pitchFamily="34" charset="0"/>
+              <a:buChar char="•"/>
+            </a:pPr>
+            <a:r>
+              <a:rPr lang="sk-SK" sz="2800" dirty="0"/>
+              <a:t> 5 najčastejších chýb pri klasifikácií</a:t>
+            </a:r>
+          </a:p>
+        </p:txBody>
+      </p:sp>
+      <p:pic>
+        <p:nvPicPr>
+          <p:cNvPr id="7" name="Obrázok 6">
+            <a:extLst>
+              <a:ext uri="{FF2B5EF4-FFF2-40B4-BE49-F238E27FC236}">
+                <a16:creationId xmlns:a16="http://schemas.microsoft.com/office/drawing/2014/main" id="{66329556-FBBC-4E75-9784-58327B96DEBC}"/>
+              </a:ext>
+            </a:extLst>
+          </p:cNvPr>
+          <p:cNvPicPr>
+            <a:picLocks noChangeAspect="1"/>
+          </p:cNvPicPr>
+          <p:nvPr/>
+        </p:nvPicPr>
+        <p:blipFill>
+          <a:blip r:embed="rId2"/>
+          <a:stretch>
+            <a:fillRect/>
+          </a:stretch>
+        </p:blipFill>
+        <p:spPr>
+          <a:xfrm>
+            <a:off x="779240" y="2796022"/>
+            <a:ext cx="10694479" cy="2399264"/>
+          </a:xfrm>
+          <a:prstGeom prst="rect">
+            <a:avLst/>
+          </a:prstGeom>
+        </p:spPr>
+      </p:pic>
+    </p:spTree>
+    <p:extLst>
+      <p:ext uri="{BB962C8B-B14F-4D97-AF65-F5344CB8AC3E}">
+        <p14:creationId xmlns:p14="http://schemas.microsoft.com/office/powerpoint/2010/main" val="844067893"/>
+      </p:ext>
+    </p:extLst>
+  </p:cSld>
+  <p:clrMapOvr>
+    <a:masterClrMapping/>
+  </p:clrMapOvr>
+</p:sld>
+</file>
+
+<file path=ppt/slides/slide11.xml><?xml version="1.0" encoding="utf-8"?>
+<p:sld xmlns:a="http://schemas.openxmlformats.org/drawingml/2006/main" xmlns:r="http://schemas.openxmlformats.org/officeDocument/2006/relationships" xmlns:p="http://schemas.openxmlformats.org/presentationml/2006/main">
+  <p:cSld>
     <p:bg>
       <p:bgPr>
         <a:gradFill rotWithShape="1">
@@ -4341,6 +4465,255 @@
   </p:cSld>
   <p:clrMapOvr>
     <a:overrideClrMapping bg1="dk1" tx1="lt1" bg2="dk2" tx2="lt2" accent1="accent1" accent2="accent2" accent3="accent3" accent4="accent4" accent5="accent5" accent6="accent6" hlink="hlink" folHlink="folHlink"/>
+  </p:clrMapOvr>
+</p:sld>
+</file>
+
+<file path=ppt/slides/slide12.xml><?xml version="1.0" encoding="utf-8"?>
+<p:sld xmlns:a="http://schemas.openxmlformats.org/drawingml/2006/main" xmlns:r="http://schemas.openxmlformats.org/officeDocument/2006/relationships" xmlns:p="http://schemas.openxmlformats.org/presentationml/2006/main">
+  <p:cSld>
+    <p:spTree>
+      <p:nvGrpSpPr>
+        <p:cNvPr id="1" name=""/>
+        <p:cNvGrpSpPr/>
+        <p:nvPr/>
+      </p:nvGrpSpPr>
+      <p:grpSpPr>
+        <a:xfrm>
+          <a:off x="0" y="0"/>
+          <a:ext cx="0" cy="0"/>
+          <a:chOff x="0" y="0"/>
+          <a:chExt cx="0" cy="0"/>
+        </a:xfrm>
+      </p:grpSpPr>
+      <p:sp>
+        <p:nvSpPr>
+          <p:cNvPr id="2" name="Nadpis 1">
+            <a:extLst>
+              <a:ext uri="{FF2B5EF4-FFF2-40B4-BE49-F238E27FC236}">
+                <a16:creationId xmlns:a16="http://schemas.microsoft.com/office/drawing/2014/main" id="{E5ABDBFE-E777-4AAA-BD4F-811CC9474FF7}"/>
+              </a:ext>
+            </a:extLst>
+          </p:cNvPr>
+          <p:cNvSpPr>
+            <a:spLocks noGrp="1"/>
+          </p:cNvSpPr>
+          <p:nvPr>
+            <p:ph type="title"/>
+          </p:nvPr>
+        </p:nvSpPr>
+        <p:spPr/>
+        <p:txBody>
+          <a:bodyPr/>
+          <a:lstStyle/>
+          <a:p>
+            <a:r>
+              <a:rPr lang="sk-SK" dirty="0"/>
+              <a:t>Zdroje</a:t>
+            </a:r>
+          </a:p>
+        </p:txBody>
+      </p:sp>
+      <p:sp>
+        <p:nvSpPr>
+          <p:cNvPr id="3" name="Zástupný objekt pre obsah 2">
+            <a:extLst>
+              <a:ext uri="{FF2B5EF4-FFF2-40B4-BE49-F238E27FC236}">
+                <a16:creationId xmlns:a16="http://schemas.microsoft.com/office/drawing/2014/main" id="{53309586-AD68-4FEE-821F-D903CAEA29EF}"/>
+              </a:ext>
+            </a:extLst>
+          </p:cNvPr>
+          <p:cNvSpPr>
+            <a:spLocks noGrp="1"/>
+          </p:cNvSpPr>
+          <p:nvPr>
+            <p:ph idx="1"/>
+          </p:nvPr>
+        </p:nvSpPr>
+        <p:spPr/>
+        <p:txBody>
+          <a:bodyPr/>
+          <a:lstStyle/>
+          <a:p>
+            <a:r>
+              <a:rPr lang="sk-SK" dirty="0"/>
+              <a:t>KERAS.IO. 2020. MNIST </a:t>
+            </a:r>
+            <a:r>
+              <a:rPr lang="sk-SK" dirty="0" err="1"/>
+              <a:t>digits</a:t>
+            </a:r>
+            <a:r>
+              <a:rPr lang="sk-SK" dirty="0"/>
+              <a:t> </a:t>
+            </a:r>
+            <a:r>
+              <a:rPr lang="sk-SK" dirty="0" err="1"/>
+              <a:t>classification</a:t>
+            </a:r>
+            <a:r>
+              <a:rPr lang="sk-SK" dirty="0"/>
+              <a:t> </a:t>
+            </a:r>
+            <a:r>
+              <a:rPr lang="sk-SK" dirty="0" err="1"/>
+              <a:t>dataset</a:t>
+            </a:r>
+            <a:r>
+              <a:rPr lang="sk-SK" dirty="0"/>
+              <a:t> [online]. 2020. [cit-2021-05-06]. Dostupné na 	internete: &lt;https://keras.io/api/datasets/mnist/&gt;</a:t>
+            </a:r>
+          </a:p>
+          <a:p>
+            <a:pPr marL="0" indent="0">
+              <a:buNone/>
+            </a:pPr>
+            <a:r>
+              <a:rPr lang="sk-SK" cap="all" dirty="0"/>
+              <a:t>machinelearningmastery.com</a:t>
+            </a:r>
+            <a:r>
+              <a:rPr lang="sk-SK" dirty="0"/>
+              <a:t>. 2020. </a:t>
+            </a:r>
+            <a:r>
+              <a:rPr lang="en-US" dirty="0"/>
+              <a:t>How to Choose an Activation Function for Deep </a:t>
+            </a:r>
+            <a:r>
+              <a:rPr lang="sk-SK" dirty="0"/>
+              <a:t>	</a:t>
+            </a:r>
+            <a:r>
+              <a:rPr lang="en-US" dirty="0"/>
+              <a:t>Learning</a:t>
+            </a:r>
+            <a:r>
+              <a:rPr lang="sk-SK" dirty="0"/>
+              <a:t>[online]. 2020. [cit-2021-05-06]. Dostupné na internete: 	</a:t>
+            </a:r>
+            <a:r>
+              <a:rPr lang="sk-SK" dirty="0">
+                <a:hlinkClick r:id="rId2"/>
+              </a:rPr>
+              <a:t>https://machinelearningmastery.com/choose-an-activation-function-for-deep-	</a:t>
+            </a:r>
+            <a:r>
+              <a:rPr lang="sk-SK" dirty="0" err="1">
+                <a:hlinkClick r:id="rId2"/>
+              </a:rPr>
+              <a:t>learning</a:t>
+            </a:r>
+            <a:r>
+              <a:rPr lang="sk-SK" dirty="0">
+                <a:hlinkClick r:id="rId2"/>
+              </a:rPr>
+              <a:t>/</a:t>
+            </a:r>
+            <a:endParaRPr lang="sk-SK" dirty="0"/>
+          </a:p>
+          <a:p>
+            <a:pPr marL="0" indent="0">
+              <a:buNone/>
+            </a:pPr>
+            <a:r>
+              <a:rPr lang="sk-SK" cap="all" dirty="0"/>
+              <a:t>python-course.eu</a:t>
+            </a:r>
+            <a:r>
+              <a:rPr lang="sk-SK" dirty="0"/>
+              <a:t>. 2020. </a:t>
+            </a:r>
+            <a:r>
+              <a:rPr lang="sk-SK" dirty="0" err="1"/>
+              <a:t>Training</a:t>
+            </a:r>
+            <a:r>
+              <a:rPr lang="sk-SK" dirty="0"/>
+              <a:t> and </a:t>
+            </a:r>
+            <a:r>
+              <a:rPr lang="sk-SK" dirty="0" err="1"/>
+              <a:t>testing</a:t>
+            </a:r>
+            <a:r>
+              <a:rPr lang="sk-SK" dirty="0"/>
+              <a:t> </a:t>
+            </a:r>
+            <a:r>
+              <a:rPr lang="sk-SK" dirty="0" err="1"/>
+              <a:t>with</a:t>
+            </a:r>
+            <a:r>
+              <a:rPr lang="sk-SK" dirty="0"/>
+              <a:t> MNIST [online]. 2020. [cit-2021-05-06]. 	Dostupné na internete: &lt;https://www.python-course.eu/neural_network_mnist.php&gt;</a:t>
+            </a:r>
+          </a:p>
+          <a:p>
+            <a:pPr marL="0" indent="0">
+              <a:buNone/>
+            </a:pPr>
+            <a:r>
+              <a:rPr lang="sk-SK" cap="all" dirty="0"/>
+              <a:t>medium.com</a:t>
+            </a:r>
+            <a:r>
+              <a:rPr lang="sk-SK" dirty="0"/>
+              <a:t>. 2020. </a:t>
+            </a:r>
+            <a:r>
+              <a:rPr lang="en-US" dirty="0"/>
+              <a:t>Digit Recognition using MNIST dataset using </a:t>
+            </a:r>
+            <a:r>
+              <a:rPr lang="en-US" dirty="0" err="1"/>
+              <a:t>Softmax</a:t>
+            </a:r>
+            <a:r>
+              <a:rPr lang="en-US" dirty="0"/>
+              <a:t> and </a:t>
+            </a:r>
+            <a:r>
+              <a:rPr lang="en-US" dirty="0" err="1"/>
+              <a:t>ReLu</a:t>
+            </a:r>
+            <a:r>
+              <a:rPr lang="en-US" dirty="0"/>
+              <a:t> Activation </a:t>
+            </a:r>
+            <a:r>
+              <a:rPr lang="sk-SK" dirty="0"/>
+              <a:t>	</a:t>
+            </a:r>
+            <a:r>
+              <a:rPr lang="en-US" dirty="0"/>
+              <a:t>function</a:t>
+            </a:r>
+            <a:r>
+              <a:rPr lang="sk-SK" dirty="0"/>
+              <a:t> [online]. 2020. [cit-2021-05-06]. Dostupné na internete: 	&lt;https://medium.com/da-tum/digit-recognition-using-mnist-dataset-using-softmax-	and-relu-activation-function-7aacd595dc53&gt;</a:t>
+            </a:r>
+          </a:p>
+          <a:p>
+            <a:pPr marL="0" indent="0">
+              <a:buNone/>
+            </a:pPr>
+            <a:endParaRPr lang="sk-SK" dirty="0"/>
+          </a:p>
+          <a:p>
+            <a:endParaRPr lang="sk-SK" dirty="0"/>
+          </a:p>
+        </p:txBody>
+      </p:sp>
+    </p:spTree>
+    <p:extLst>
+      <p:ext uri="{BB962C8B-B14F-4D97-AF65-F5344CB8AC3E}">
+        <p14:creationId xmlns:p14="http://schemas.microsoft.com/office/powerpoint/2010/main" val="3786338438"/>
+      </p:ext>
+    </p:extLst>
+  </p:cSld>
+  <p:clrMapOvr>
+    <a:masterClrMapping/>
   </p:clrMapOvr>
 </p:sld>
 </file>
@@ -5580,6 +5953,366 @@
           <a:chExt cx="0" cy="0"/>
         </a:xfrm>
       </p:grpSpPr>
+      <p:sp useBgFill="1">
+        <p:nvSpPr>
+          <p:cNvPr id="12" name="Rectangle 11">
+            <a:extLst>
+              <a:ext uri="{FF2B5EF4-FFF2-40B4-BE49-F238E27FC236}">
+                <a16:creationId xmlns:a16="http://schemas.microsoft.com/office/drawing/2014/main" id="{873ECEC8-0F24-45B8-950F-35FC94BCEAC8}"/>
+              </a:ext>
+              <a:ext uri="{C183D7F6-B498-43B3-948B-1728B52AA6E4}">
+                <adec:decorative xmlns:adec="http://schemas.microsoft.com/office/drawing/2017/decorative" val="1"/>
+              </a:ext>
+            </a:extLst>
+          </p:cNvPr>
+          <p:cNvSpPr>
+            <a:spLocks noGrp="1" noRot="1" noChangeAspect="1" noMove="1" noResize="1" noEditPoints="1" noAdjustHandles="1" noChangeArrowheads="1" noChangeShapeType="1" noTextEdit="1"/>
+          </p:cNvSpPr>
+          <p:nvPr>
+            <p:extLst>
+              <p:ext uri="{386F3935-93C4-4BCD-93E2-E3B085C9AB24}">
+                <p16:designElem xmlns:p16="http://schemas.microsoft.com/office/powerpoint/2015/main" val="1"/>
+              </p:ext>
+            </p:extLst>
+          </p:nvPr>
+        </p:nvSpPr>
+        <p:spPr>
+          <a:xfrm>
+            <a:off x="0" y="0"/>
+            <a:ext cx="12192001" cy="6334316"/>
+          </a:xfrm>
+          <a:prstGeom prst="rect">
+            <a:avLst/>
+          </a:prstGeom>
+          <a:ln>
+            <a:noFill/>
+          </a:ln>
+        </p:spPr>
+        <p:style>
+          <a:lnRef idx="2">
+            <a:schemeClr val="accent1">
+              <a:shade val="50000"/>
+            </a:schemeClr>
+          </a:lnRef>
+          <a:fillRef idx="1">
+            <a:schemeClr val="accent1"/>
+          </a:fillRef>
+          <a:effectRef idx="0">
+            <a:schemeClr val="accent1"/>
+          </a:effectRef>
+          <a:fontRef idx="minor">
+            <a:schemeClr val="lt1"/>
+          </a:fontRef>
+        </p:style>
+        <p:txBody>
+          <a:bodyPr rtlCol="0" anchor="ctr"/>
+          <a:lstStyle/>
+          <a:p>
+            <a:pPr algn="ctr"/>
+            <a:endParaRPr lang="en-US"/>
+          </a:p>
+        </p:txBody>
+      </p:sp>
+      <p:sp>
+        <p:nvSpPr>
+          <p:cNvPr id="2" name="Nadpis 1">
+            <a:extLst>
+              <a:ext uri="{FF2B5EF4-FFF2-40B4-BE49-F238E27FC236}">
+                <a16:creationId xmlns:a16="http://schemas.microsoft.com/office/drawing/2014/main" id="{8B83F426-0940-4F71-AB20-7ECEBD063D30}"/>
+              </a:ext>
+            </a:extLst>
+          </p:cNvPr>
+          <p:cNvSpPr>
+            <a:spLocks noGrp="1"/>
+          </p:cNvSpPr>
+          <p:nvPr>
+            <p:ph type="title"/>
+          </p:nvPr>
+        </p:nvSpPr>
+        <p:spPr>
+          <a:xfrm>
+            <a:off x="7859485" y="634946"/>
+            <a:ext cx="3690257" cy="1450757"/>
+          </a:xfrm>
+        </p:spPr>
+        <p:txBody>
+          <a:bodyPr>
+            <a:normAutofit/>
+          </a:bodyPr>
+          <a:lstStyle/>
+          <a:p>
+            <a:r>
+              <a:rPr lang="sk-SK" sz="4100"/>
+              <a:t>Trénovanie neurónovej siete</a:t>
+            </a:r>
+          </a:p>
+        </p:txBody>
+      </p:sp>
+      <p:pic>
+        <p:nvPicPr>
+          <p:cNvPr id="5" name="Zástupný objekt pre obsah 4" descr="Obrázok, na ktorom je stôl&#10;&#10;Automaticky generovaný popis">
+            <a:extLst>
+              <a:ext uri="{FF2B5EF4-FFF2-40B4-BE49-F238E27FC236}">
+                <a16:creationId xmlns:a16="http://schemas.microsoft.com/office/drawing/2014/main" id="{0A5777B0-75FC-41A3-8321-3387C72A8098}"/>
+              </a:ext>
+            </a:extLst>
+          </p:cNvPr>
+          <p:cNvPicPr>
+            <a:picLocks noChangeAspect="1"/>
+          </p:cNvPicPr>
+          <p:nvPr/>
+        </p:nvPicPr>
+        <p:blipFill rotWithShape="1">
+          <a:blip r:embed="rId2"/>
+          <a:srcRect r="25238"/>
+          <a:stretch/>
+        </p:blipFill>
+        <p:spPr>
+          <a:xfrm>
+            <a:off x="633999" y="640081"/>
+            <a:ext cx="6909801" cy="5314406"/>
+          </a:xfrm>
+          <a:prstGeom prst="rect">
+            <a:avLst/>
+          </a:prstGeom>
+        </p:spPr>
+      </p:pic>
+      <p:cxnSp>
+        <p:nvCxnSpPr>
+          <p:cNvPr id="14" name="Straight Connector 13">
+            <a:extLst>
+              <a:ext uri="{FF2B5EF4-FFF2-40B4-BE49-F238E27FC236}">
+                <a16:creationId xmlns:a16="http://schemas.microsoft.com/office/drawing/2014/main" id="{89EB8C68-FF1B-4849-867B-32D29B19F102}"/>
+              </a:ext>
+              <a:ext uri="{C183D7F6-B498-43B3-948B-1728B52AA6E4}">
+                <adec:decorative xmlns:adec="http://schemas.microsoft.com/office/drawing/2017/decorative" val="1"/>
+              </a:ext>
+            </a:extLst>
+          </p:cNvPr>
+          <p:cNvCxnSpPr>
+            <a:cxnSpLocks noGrp="1" noRot="1" noChangeAspect="1" noMove="1" noResize="1" noEditPoints="1" noAdjustHandles="1" noChangeArrowheads="1" noChangeShapeType="1"/>
+          </p:cNvCxnSpPr>
+          <p:nvPr>
+            <p:extLst>
+              <p:ext uri="{386F3935-93C4-4BCD-93E2-E3B085C9AB24}">
+                <p16:designElem xmlns:p16="http://schemas.microsoft.com/office/powerpoint/2015/main" val="1"/>
+              </p:ext>
+            </p:extLst>
+          </p:nvPr>
+        </p:nvCxnSpPr>
+        <p:spPr>
+          <a:xfrm>
+            <a:off x="7892143" y="2085703"/>
+            <a:ext cx="3566160" cy="0"/>
+          </a:xfrm>
+          <a:prstGeom prst="line">
+            <a:avLst/>
+          </a:prstGeom>
+          <a:ln w="6350">
+            <a:solidFill>
+              <a:schemeClr val="tx1">
+                <a:lumMod val="50000"/>
+                <a:lumOff val="50000"/>
+                <a:alpha val="90000"/>
+              </a:schemeClr>
+            </a:solidFill>
+          </a:ln>
+        </p:spPr>
+        <p:style>
+          <a:lnRef idx="1">
+            <a:schemeClr val="accent1"/>
+          </a:lnRef>
+          <a:fillRef idx="0">
+            <a:schemeClr val="accent1"/>
+          </a:fillRef>
+          <a:effectRef idx="0">
+            <a:schemeClr val="accent1"/>
+          </a:effectRef>
+          <a:fontRef idx="minor">
+            <a:schemeClr val="tx1"/>
+          </a:fontRef>
+        </p:style>
+      </p:cxnSp>
+      <p:sp>
+        <p:nvSpPr>
+          <p:cNvPr id="9" name="Content Placeholder 8">
+            <a:extLst>
+              <a:ext uri="{FF2B5EF4-FFF2-40B4-BE49-F238E27FC236}">
+                <a16:creationId xmlns:a16="http://schemas.microsoft.com/office/drawing/2014/main" id="{45134E89-1BB0-4B39-9F25-412AF75EE235}"/>
+              </a:ext>
+            </a:extLst>
+          </p:cNvPr>
+          <p:cNvSpPr>
+            <a:spLocks noGrp="1"/>
+          </p:cNvSpPr>
+          <p:nvPr>
+            <p:ph idx="1"/>
+          </p:nvPr>
+        </p:nvSpPr>
+        <p:spPr>
+          <a:xfrm>
+            <a:off x="7859485" y="2198914"/>
+            <a:ext cx="3690257" cy="3670180"/>
+          </a:xfrm>
+        </p:spPr>
+        <p:txBody>
+          <a:bodyPr>
+            <a:normAutofit/>
+          </a:bodyPr>
+          <a:lstStyle/>
+          <a:p>
+            <a:endParaRPr lang="en-US"/>
+          </a:p>
+        </p:txBody>
+      </p:sp>
+      <p:sp>
+        <p:nvSpPr>
+          <p:cNvPr id="16" name="Rectangle 15">
+            <a:extLst>
+              <a:ext uri="{FF2B5EF4-FFF2-40B4-BE49-F238E27FC236}">
+                <a16:creationId xmlns:a16="http://schemas.microsoft.com/office/drawing/2014/main" id="{7D417315-0A35-4882-ABD2-ABE3C89E5DCF}"/>
+              </a:ext>
+              <a:ext uri="{C183D7F6-B498-43B3-948B-1728B52AA6E4}">
+                <adec:decorative xmlns:adec="http://schemas.microsoft.com/office/drawing/2017/decorative" val="1"/>
+              </a:ext>
+            </a:extLst>
+          </p:cNvPr>
+          <p:cNvSpPr>
+            <a:spLocks noGrp="1" noRot="1" noChangeAspect="1" noMove="1" noResize="1" noEditPoints="1" noAdjustHandles="1" noChangeArrowheads="1" noChangeShapeType="1" noTextEdit="1"/>
+          </p:cNvSpPr>
+          <p:nvPr>
+            <p:extLst>
+              <p:ext uri="{386F3935-93C4-4BCD-93E2-E3B085C9AB24}">
+                <p16:designElem xmlns:p16="http://schemas.microsoft.com/office/powerpoint/2015/main" val="1"/>
+              </p:ext>
+            </p:extLst>
+          </p:nvPr>
+        </p:nvSpPr>
+        <p:spPr>
+          <a:xfrm>
+            <a:off x="15" y="6334316"/>
+            <a:ext cx="12191985" cy="66484"/>
+          </a:xfrm>
+          <a:prstGeom prst="rect">
+            <a:avLst/>
+          </a:prstGeom>
+          <a:solidFill>
+            <a:schemeClr val="accent1"/>
+          </a:solidFill>
+          <a:ln>
+            <a:noFill/>
+          </a:ln>
+        </p:spPr>
+        <p:style>
+          <a:lnRef idx="2">
+            <a:schemeClr val="accent1">
+              <a:shade val="50000"/>
+            </a:schemeClr>
+          </a:lnRef>
+          <a:fillRef idx="1">
+            <a:schemeClr val="accent1"/>
+          </a:fillRef>
+          <a:effectRef idx="0">
+            <a:schemeClr val="accent1"/>
+          </a:effectRef>
+          <a:fontRef idx="minor">
+            <a:schemeClr val="lt1"/>
+          </a:fontRef>
+        </p:style>
+      </p:sp>
+      <p:sp>
+        <p:nvSpPr>
+          <p:cNvPr id="18" name="Rectangle 17">
+            <a:extLst>
+              <a:ext uri="{FF2B5EF4-FFF2-40B4-BE49-F238E27FC236}">
+                <a16:creationId xmlns:a16="http://schemas.microsoft.com/office/drawing/2014/main" id="{8B53612E-ADB2-4457-9688-89506397AF28}"/>
+              </a:ext>
+              <a:ext uri="{C183D7F6-B498-43B3-948B-1728B52AA6E4}">
+                <adec:decorative xmlns:adec="http://schemas.microsoft.com/office/drawing/2017/decorative" val="1"/>
+              </a:ext>
+            </a:extLst>
+          </p:cNvPr>
+          <p:cNvSpPr>
+            <a:spLocks noGrp="1" noRot="1" noChangeAspect="1" noMove="1" noResize="1" noEditPoints="1" noAdjustHandles="1" noChangeArrowheads="1" noChangeShapeType="1" noTextEdit="1"/>
+          </p:cNvSpPr>
+          <p:nvPr>
+            <p:extLst>
+              <p:ext uri="{386F3935-93C4-4BCD-93E2-E3B085C9AB24}">
+                <p16:designElem xmlns:p16="http://schemas.microsoft.com/office/powerpoint/2015/main" val="1"/>
+              </p:ext>
+            </p:extLst>
+          </p:nvPr>
+        </p:nvSpPr>
+        <p:spPr>
+          <a:xfrm>
+            <a:off x="1" y="6400800"/>
+            <a:ext cx="12192000" cy="457200"/>
+          </a:xfrm>
+          <a:prstGeom prst="rect">
+            <a:avLst/>
+          </a:prstGeom>
+          <a:solidFill>
+            <a:schemeClr val="accent2"/>
+          </a:solidFill>
+          <a:ln>
+            <a:noFill/>
+          </a:ln>
+        </p:spPr>
+        <p:style>
+          <a:lnRef idx="2">
+            <a:schemeClr val="accent1">
+              <a:shade val="50000"/>
+            </a:schemeClr>
+          </a:lnRef>
+          <a:fillRef idx="1">
+            <a:schemeClr val="accent1"/>
+          </a:fillRef>
+          <a:effectRef idx="0">
+            <a:schemeClr val="accent1"/>
+          </a:effectRef>
+          <a:fontRef idx="minor">
+            <a:schemeClr val="lt1"/>
+          </a:fontRef>
+        </p:style>
+      </p:sp>
+    </p:spTree>
+    <p:extLst>
+      <p:ext uri="{BB962C8B-B14F-4D97-AF65-F5344CB8AC3E}">
+        <p14:creationId xmlns:p14="http://schemas.microsoft.com/office/powerpoint/2010/main" val="243355609"/>
+      </p:ext>
+    </p:extLst>
+  </p:cSld>
+  <p:clrMapOvr>
+    <a:masterClrMapping/>
+  </p:clrMapOvr>
+</p:sld>
+</file>
+
+<file path=ppt/slides/slide7.xml><?xml version="1.0" encoding="utf-8"?>
+<p:sld xmlns:a="http://schemas.openxmlformats.org/drawingml/2006/main" xmlns:r="http://schemas.openxmlformats.org/officeDocument/2006/relationships" xmlns:p="http://schemas.openxmlformats.org/presentationml/2006/main">
+  <p:cSld>
+    <p:bg>
+      <p:bgPr>
+        <a:solidFill>
+          <a:schemeClr val="bg1"/>
+        </a:solidFill>
+        <a:effectLst/>
+      </p:bgPr>
+    </p:bg>
+    <p:spTree>
+      <p:nvGrpSpPr>
+        <p:cNvPr id="1" name=""/>
+        <p:cNvGrpSpPr/>
+        <p:nvPr/>
+      </p:nvGrpSpPr>
+      <p:grpSpPr>
+        <a:xfrm>
+          <a:off x="0" y="0"/>
+          <a:ext cx="0" cy="0"/>
+          <a:chOff x="0" y="0"/>
+          <a:chExt cx="0" cy="0"/>
+        </a:xfrm>
+      </p:grpSpPr>
       <p:pic>
         <p:nvPicPr>
           <p:cNvPr id="4" name="Obrázok 3">
@@ -5619,153 +6352,6 @@
     <p:extLst>
       <p:ext uri="{BB962C8B-B14F-4D97-AF65-F5344CB8AC3E}">
         <p14:creationId xmlns:p14="http://schemas.microsoft.com/office/powerpoint/2010/main" val="316308883"/>
-      </p:ext>
-    </p:extLst>
-  </p:cSld>
-  <p:clrMapOvr>
-    <a:masterClrMapping/>
-  </p:clrMapOvr>
-</p:sld>
-</file>
-
-<file path=ppt/slides/slide7.xml><?xml version="1.0" encoding="utf-8"?>
-<p:sld xmlns:a="http://schemas.openxmlformats.org/drawingml/2006/main" xmlns:r="http://schemas.openxmlformats.org/officeDocument/2006/relationships" xmlns:p="http://schemas.openxmlformats.org/presentationml/2006/main">
-  <p:cSld>
-    <p:spTree>
-      <p:nvGrpSpPr>
-        <p:cNvPr id="1" name=""/>
-        <p:cNvGrpSpPr/>
-        <p:nvPr/>
-      </p:nvGrpSpPr>
-      <p:grpSpPr>
-        <a:xfrm>
-          <a:off x="0" y="0"/>
-          <a:ext cx="0" cy="0"/>
-          <a:chOff x="0" y="0"/>
-          <a:chExt cx="0" cy="0"/>
-        </a:xfrm>
-      </p:grpSpPr>
-      <p:sp>
-        <p:nvSpPr>
-          <p:cNvPr id="2" name="Nadpis 1">
-            <a:extLst>
-              <a:ext uri="{FF2B5EF4-FFF2-40B4-BE49-F238E27FC236}">
-                <a16:creationId xmlns:a16="http://schemas.microsoft.com/office/drawing/2014/main" id="{2E648A18-8B50-48B9-962E-D37B6CF9A1CE}"/>
-              </a:ext>
-            </a:extLst>
-          </p:cNvPr>
-          <p:cNvSpPr>
-            <a:spLocks noGrp="1"/>
-          </p:cNvSpPr>
-          <p:nvPr>
-            <p:ph type="title"/>
-          </p:nvPr>
-        </p:nvSpPr>
-        <p:spPr/>
-        <p:txBody>
-          <a:bodyPr/>
-          <a:lstStyle/>
-          <a:p>
-            <a:r>
-              <a:rPr lang="sk-SK" dirty="0"/>
-              <a:t>Výsledky klasifikácie</a:t>
-            </a:r>
-          </a:p>
-        </p:txBody>
-      </p:sp>
-      <p:pic>
-        <p:nvPicPr>
-          <p:cNvPr id="5" name="Zástupný objekt pre obsah 4">
-            <a:extLst>
-              <a:ext uri="{FF2B5EF4-FFF2-40B4-BE49-F238E27FC236}">
-                <a16:creationId xmlns:a16="http://schemas.microsoft.com/office/drawing/2014/main" id="{361F6BDF-30E1-465F-A1D3-B1C2DCF310AB}"/>
-              </a:ext>
-            </a:extLst>
-          </p:cNvPr>
-          <p:cNvPicPr>
-            <a:picLocks noGrp="1" noChangeAspect="1"/>
-          </p:cNvPicPr>
-          <p:nvPr>
-            <p:ph idx="1"/>
-          </p:nvPr>
-        </p:nvPicPr>
-        <p:blipFill>
-          <a:blip r:embed="rId2"/>
-          <a:stretch>
-            <a:fillRect/>
-          </a:stretch>
-        </p:blipFill>
-        <p:spPr>
-          <a:xfrm>
-            <a:off x="554642" y="2104839"/>
-            <a:ext cx="4508612" cy="3034853"/>
-          </a:xfrm>
-        </p:spPr>
-      </p:pic>
-      <p:pic>
-        <p:nvPicPr>
-          <p:cNvPr id="7" name="Obrázok 6">
-            <a:extLst>
-              <a:ext uri="{FF2B5EF4-FFF2-40B4-BE49-F238E27FC236}">
-                <a16:creationId xmlns:a16="http://schemas.microsoft.com/office/drawing/2014/main" id="{6AF0AD3E-6B88-43F4-9A3D-C65D53599119}"/>
-              </a:ext>
-            </a:extLst>
-          </p:cNvPr>
-          <p:cNvPicPr>
-            <a:picLocks noChangeAspect="1"/>
-          </p:cNvPicPr>
-          <p:nvPr/>
-        </p:nvPicPr>
-        <p:blipFill>
-          <a:blip r:embed="rId3"/>
-          <a:stretch>
-            <a:fillRect/>
-          </a:stretch>
-        </p:blipFill>
-        <p:spPr>
-          <a:xfrm>
-            <a:off x="6721780" y="2085787"/>
-            <a:ext cx="4433900" cy="3034854"/>
-          </a:xfrm>
-          <a:prstGeom prst="rect">
-            <a:avLst/>
-          </a:prstGeom>
-        </p:spPr>
-      </p:pic>
-      <p:pic>
-        <p:nvPicPr>
-          <p:cNvPr id="9" name="Obrázok 8">
-            <a:extLst>
-              <a:ext uri="{FF2B5EF4-FFF2-40B4-BE49-F238E27FC236}">
-                <a16:creationId xmlns:a16="http://schemas.microsoft.com/office/drawing/2014/main" id="{53951158-5AF3-45CB-984F-96A42F833495}"/>
-              </a:ext>
-            </a:extLst>
-          </p:cNvPr>
-          <p:cNvPicPr>
-            <a:picLocks noChangeAspect="1"/>
-          </p:cNvPicPr>
-          <p:nvPr/>
-        </p:nvPicPr>
-        <p:blipFill>
-          <a:blip r:embed="rId4"/>
-          <a:stretch>
-            <a:fillRect/>
-          </a:stretch>
-        </p:blipFill>
-        <p:spPr>
-          <a:xfrm>
-            <a:off x="608834" y="5288065"/>
-            <a:ext cx="5487166" cy="219106"/>
-          </a:xfrm>
-          <a:prstGeom prst="rect">
-            <a:avLst/>
-          </a:prstGeom>
-        </p:spPr>
-      </p:pic>
-    </p:spTree>
-    <p:extLst>
-      <p:ext uri="{BB962C8B-B14F-4D97-AF65-F5344CB8AC3E}">
-        <p14:creationId xmlns:p14="http://schemas.microsoft.com/office/powerpoint/2010/main" val="2573826273"/>
       </p:ext>
     </p:extLst>
   </p:cSld>
@@ -5797,7 +6383,7 @@
           <p:cNvPr id="2" name="Nadpis 1">
             <a:extLst>
               <a:ext uri="{FF2B5EF4-FFF2-40B4-BE49-F238E27FC236}">
-                <a16:creationId xmlns:a16="http://schemas.microsoft.com/office/drawing/2014/main" id="{2F1F110A-F53D-450D-978E-5C2A248192D5}"/>
+                <a16:creationId xmlns:a16="http://schemas.microsoft.com/office/drawing/2014/main" id="{2E648A18-8B50-48B9-962E-D37B6CF9A1CE}"/>
               </a:ext>
             </a:extLst>
           </p:cNvPr>
@@ -5813,41 +6399,48 @@
           <a:bodyPr/>
           <a:lstStyle/>
           <a:p>
-            <a:endParaRPr lang="sk-SK" dirty="0"/>
-          </a:p>
-        </p:txBody>
-      </p:sp>
-      <p:sp>
-        <p:nvSpPr>
-          <p:cNvPr id="3" name="Zástupný objekt pre obsah 2">
+            <a:r>
+              <a:rPr lang="sk-SK" dirty="0"/>
+              <a:t>Výsledky klasifikácie</a:t>
+            </a:r>
+          </a:p>
+        </p:txBody>
+      </p:sp>
+      <p:pic>
+        <p:nvPicPr>
+          <p:cNvPr id="5" name="Zástupný objekt pre obsah 4">
             <a:extLst>
               <a:ext uri="{FF2B5EF4-FFF2-40B4-BE49-F238E27FC236}">
-                <a16:creationId xmlns:a16="http://schemas.microsoft.com/office/drawing/2014/main" id="{42A8252D-014A-46B6-B225-89C89C64A8C4}"/>
+                <a16:creationId xmlns:a16="http://schemas.microsoft.com/office/drawing/2014/main" id="{361F6BDF-30E1-465F-A1D3-B1C2DCF310AB}"/>
               </a:ext>
             </a:extLst>
           </p:cNvPr>
-          <p:cNvSpPr>
-            <a:spLocks noGrp="1"/>
-          </p:cNvSpPr>
+          <p:cNvPicPr>
+            <a:picLocks noGrp="1" noChangeAspect="1"/>
+          </p:cNvPicPr>
           <p:nvPr>
             <p:ph idx="1"/>
           </p:nvPr>
-        </p:nvSpPr>
-        <p:spPr/>
-        <p:txBody>
-          <a:bodyPr/>
-          <a:lstStyle/>
-          <a:p>
-            <a:endParaRPr lang="sk-SK"/>
-          </a:p>
-        </p:txBody>
-      </p:sp>
+        </p:nvPicPr>
+        <p:blipFill>
+          <a:blip r:embed="rId2"/>
+          <a:stretch>
+            <a:fillRect/>
+          </a:stretch>
+        </p:blipFill>
+        <p:spPr>
+          <a:xfrm>
+            <a:off x="554642" y="2104839"/>
+            <a:ext cx="4508612" cy="3034853"/>
+          </a:xfrm>
+        </p:spPr>
+      </p:pic>
       <p:pic>
         <p:nvPicPr>
-          <p:cNvPr id="5" name="Obrázok 4">
+          <p:cNvPr id="7" name="Obrázok 6">
             <a:extLst>
               <a:ext uri="{FF2B5EF4-FFF2-40B4-BE49-F238E27FC236}">
-                <a16:creationId xmlns:a16="http://schemas.microsoft.com/office/drawing/2014/main" id="{0E2C4E93-7510-495F-9D9F-FFB1EFE55041}"/>
+                <a16:creationId xmlns:a16="http://schemas.microsoft.com/office/drawing/2014/main" id="{6AF0AD3E-6B88-43F4-9A3D-C65D53599119}"/>
               </a:ext>
             </a:extLst>
           </p:cNvPr>
@@ -5857,15 +6450,45 @@
           <p:nvPr/>
         </p:nvPicPr>
         <p:blipFill>
-          <a:blip r:embed="rId2"/>
+          <a:blip r:embed="rId3"/>
           <a:stretch>
             <a:fillRect/>
           </a:stretch>
         </p:blipFill>
         <p:spPr>
           <a:xfrm>
-            <a:off x="0" y="9686"/>
-            <a:ext cx="12192000" cy="6848314"/>
+            <a:off x="6721780" y="2085787"/>
+            <a:ext cx="4433900" cy="3034854"/>
+          </a:xfrm>
+          <a:prstGeom prst="rect">
+            <a:avLst/>
+          </a:prstGeom>
+        </p:spPr>
+      </p:pic>
+      <p:pic>
+        <p:nvPicPr>
+          <p:cNvPr id="4" name="Obrázok 3">
+            <a:extLst>
+              <a:ext uri="{FF2B5EF4-FFF2-40B4-BE49-F238E27FC236}">
+                <a16:creationId xmlns:a16="http://schemas.microsoft.com/office/drawing/2014/main" id="{EFA61854-E57E-4A9E-AFFF-1CFFD19E4080}"/>
+              </a:ext>
+            </a:extLst>
+          </p:cNvPr>
+          <p:cNvPicPr>
+            <a:picLocks noChangeAspect="1"/>
+          </p:cNvPicPr>
+          <p:nvPr/>
+        </p:nvPicPr>
+        <p:blipFill>
+          <a:blip r:embed="rId4"/>
+          <a:stretch>
+            <a:fillRect/>
+          </a:stretch>
+        </p:blipFill>
+        <p:spPr>
+          <a:xfrm>
+            <a:off x="1091384" y="5230907"/>
+            <a:ext cx="5934903" cy="276264"/>
           </a:xfrm>
           <a:prstGeom prst="rect">
             <a:avLst/>
@@ -5875,7 +6498,7 @@
     </p:spTree>
     <p:extLst>
       <p:ext uri="{BB962C8B-B14F-4D97-AF65-F5344CB8AC3E}">
-        <p14:creationId xmlns:p14="http://schemas.microsoft.com/office/powerpoint/2010/main" val="4292619019"/>
+        <p14:creationId xmlns:p14="http://schemas.microsoft.com/office/powerpoint/2010/main" val="2573826273"/>
       </p:ext>
     </p:extLst>
   </p:cSld>
@@ -5907,7 +6530,7 @@
           <p:cNvPr id="2" name="Nadpis 1">
             <a:extLst>
               <a:ext uri="{FF2B5EF4-FFF2-40B4-BE49-F238E27FC236}">
-                <a16:creationId xmlns:a16="http://schemas.microsoft.com/office/drawing/2014/main" id="{532FA631-A2AE-41C3-B177-7B4051579762}"/>
+                <a16:creationId xmlns:a16="http://schemas.microsoft.com/office/drawing/2014/main" id="{2F1F110A-F53D-450D-978E-5C2A248192D5}"/>
               </a:ext>
             </a:extLst>
           </p:cNvPr>
@@ -5923,10 +6546,7 @@
           <a:bodyPr/>
           <a:lstStyle/>
           <a:p>
-            <a:r>
-              <a:rPr lang="sk-SK" dirty="0"/>
-              <a:t>Najčastejšie chyby</a:t>
-            </a:r>
+            <a:endParaRPr lang="sk-SK" dirty="0"/>
           </a:p>
         </p:txBody>
       </p:sp>
@@ -5935,7 +6555,7 @@
           <p:cNvPr id="3" name="Zástupný objekt pre obsah 2">
             <a:extLst>
               <a:ext uri="{FF2B5EF4-FFF2-40B4-BE49-F238E27FC236}">
-                <a16:creationId xmlns:a16="http://schemas.microsoft.com/office/drawing/2014/main" id="{9ED4A7A2-D93E-4E86-827C-93BC94A45275}"/>
+                <a16:creationId xmlns:a16="http://schemas.microsoft.com/office/drawing/2014/main" id="{42A8252D-014A-46B6-B225-89C89C64A8C4}"/>
               </a:ext>
             </a:extLst>
           </p:cNvPr>
@@ -5948,28 +6568,19 @@
         </p:nvSpPr>
         <p:spPr/>
         <p:txBody>
-          <a:bodyPr>
-            <a:normAutofit/>
-          </a:bodyPr>
+          <a:bodyPr/>
           <a:lstStyle/>
           <a:p>
-            <a:pPr>
-              <a:buFont typeface="Arial" panose="020B0604020202020204" pitchFamily="34" charset="0"/>
-              <a:buChar char="•"/>
-            </a:pPr>
-            <a:r>
-              <a:rPr lang="sk-SK" sz="2800" dirty="0"/>
-              <a:t> 5 najčastejších chýb pri klasifikácií</a:t>
-            </a:r>
+            <a:endParaRPr lang="sk-SK"/>
           </a:p>
         </p:txBody>
       </p:sp>
       <p:pic>
         <p:nvPicPr>
-          <p:cNvPr id="7" name="Obrázok 6">
+          <p:cNvPr id="5" name="Obrázok 4">
             <a:extLst>
               <a:ext uri="{FF2B5EF4-FFF2-40B4-BE49-F238E27FC236}">
-                <a16:creationId xmlns:a16="http://schemas.microsoft.com/office/drawing/2014/main" id="{66329556-FBBC-4E75-9784-58327B96DEBC}"/>
+                <a16:creationId xmlns:a16="http://schemas.microsoft.com/office/drawing/2014/main" id="{0E2C4E93-7510-495F-9D9F-FFB1EFE55041}"/>
               </a:ext>
             </a:extLst>
           </p:cNvPr>
@@ -5986,8 +6597,8 @@
         </p:blipFill>
         <p:spPr>
           <a:xfrm>
-            <a:off x="779240" y="2796022"/>
-            <a:ext cx="10694479" cy="2399264"/>
+            <a:off x="0" y="9686"/>
+            <a:ext cx="12192000" cy="6848314"/>
           </a:xfrm>
           <a:prstGeom prst="rect">
             <a:avLst/>
@@ -5997,7 +6608,7 @@
     </p:spTree>
     <p:extLst>
       <p:ext uri="{BB962C8B-B14F-4D97-AF65-F5344CB8AC3E}">
-        <p14:creationId xmlns:p14="http://schemas.microsoft.com/office/powerpoint/2010/main" val="844067893"/>
+        <p14:creationId xmlns:p14="http://schemas.microsoft.com/office/powerpoint/2010/main" val="4292619019"/>
       </p:ext>
     </p:extLst>
   </p:cSld>

</xml_diff>